<commit_message>
Upload pptx as slides
</commit_message>
<xml_diff>
--- a/docs/conclusion.pptx
+++ b/docs/conclusion.pptx
@@ -6222,8 +6222,27 @@
             </a:r>
             <a:r>
               <a:rPr lang="zh-CN" altLang="en-US" dirty="0"/>
-              <a:t>程序，算一下</a:t>
-            </a:r>
+              <a:t>程序，算一下。</a:t>
+            </a:r>
+            <a:endParaRPr lang="en-US" altLang="zh-CN" dirty="0"/>
+          </a:p>
+          <a:p>
+            <a:endParaRPr lang="en-US" altLang="zh-CN" dirty="0"/>
+          </a:p>
+          <a:p>
+            <a:r>
+              <a:rPr lang="zh-CN" altLang="en-US" dirty="0"/>
+              <a:t>（本组数据与接下来的两个 </a:t>
+            </a:r>
+            <a:r>
+              <a:rPr lang="en-US" altLang="zh-CN" dirty="0"/>
+              <a:t>ppt </a:t>
+            </a:r>
+            <a:r>
+              <a:rPr lang="zh-CN" altLang="en-US"/>
+              <a:t>中的图片，与结题报告结果分属两组不同时间的测试）</a:t>
+            </a:r>
+            <a:endParaRPr lang="en-US" altLang="zh-CN" dirty="0"/>
           </a:p>
         </p:txBody>
       </p:sp>

</xml_diff>